<commit_message>
Completed presentation on RQ
</commit_message>
<xml_diff>
--- a/reseach_question_presentation_template.pptx
+++ b/reseach_question_presentation_template.pptx
@@ -256,7 +256,7 @@
             <a:fld id="{93FAAC3A-BD1F-4A00-9099-74B95789FE00}" type="datetimeFigureOut">
               <a:rPr lang="en-GB" smtClean="0"/>
               <a:pPr/>
-              <a:t>29/11/2025</a:t>
+              <a:t>02/12/2025</a:t>
             </a:fld>
             <a:endParaRPr lang="en-GB"/>
           </a:p>
@@ -435,7 +435,7 @@
             <a:fld id="{8E359C8A-39F6-4045-9163-4042C4C26B15}" type="datetimeFigureOut">
               <a:rPr lang="en-GB" smtClean="0"/>
               <a:pPr/>
-              <a:t>29/11/2025</a:t>
+              <a:t>02/12/2025</a:t>
             </a:fld>
             <a:endParaRPr lang="en-GB"/>
           </a:p>
@@ -5250,7 +5250,7 @@
               </a:spcAft>
             </a:pPr>
             <a:r>
-              <a:rPr lang="en-GB">
+              <a:rPr lang="en-GB" dirty="0">
                 <a:solidFill>
                   <a:srgbClr val="203232"/>
                 </a:solidFill>
@@ -5258,7 +5258,7 @@
               </a:rPr>
               <a:t>Here is a sample of our dataset: </a:t>
             </a:r>
-            <a:endParaRPr lang="en-GB" sz="1800">
+            <a:endParaRPr lang="en-GB" sz="1800" dirty="0">
               <a:solidFill>
                 <a:srgbClr val="FF0000"/>
               </a:solidFill>
@@ -5347,13 +5347,13 @@
         </p:nvSpPr>
         <p:spPr>
           <a:xfrm>
-            <a:off x="964884" y="2089858"/>
-            <a:ext cx="9965844" cy="2649857"/>
+            <a:off x="902197" y="3429000"/>
+            <a:ext cx="10913623" cy="2649857"/>
           </a:xfrm>
         </p:spPr>
         <p:txBody>
           <a:bodyPr>
-            <a:normAutofit fontScale="90000"/>
+            <a:normAutofit/>
           </a:bodyPr>
           <a:lstStyle/>
           <a:p>
@@ -5368,114 +5368,74 @@
                 <a:spcPts val="992"/>
               </a:spcAft>
             </a:pPr>
-            <a:r>
-              <a:rPr lang="en-GB" sz="3600" dirty="0">
-                <a:solidFill>
-                  <a:srgbClr val="FF0000"/>
-                </a:solidFill>
+            <a:br>
+              <a:rPr lang="en-US" sz="2400" b="0" spc="-100" dirty="0">
+                <a:solidFill>
+                  <a:srgbClr val="203232"/>
+                </a:solidFill>
+                <a:latin typeface="+mn-lt"/>
+                <a:ea typeface="+mn-ea"/>
                 <a:cs typeface="Arial"/>
               </a:rPr>
-              <a:t>Include summary information of your dataset, to include </a:t>
-            </a:r>
-            <a:endParaRPr lang="en-US" sz="3600" b="0" dirty="0">
+            </a:br>
+            <a:r>
+              <a:rPr lang="en-US" sz="2400" b="0" spc="-100" dirty="0">
+                <a:solidFill>
+                  <a:srgbClr val="203232"/>
+                </a:solidFill>
+                <a:latin typeface="+mn-lt"/>
+                <a:ea typeface="+mn-ea"/>
+                <a:cs typeface="Arial"/>
+              </a:rPr>
+              <a:t>Two Columns Names are -  Confirmatory and Presumptive Lab Total Tested (Daily)  And Confirmatory and Presumptive Lab Percent Positive (Daily)</a:t>
+            </a:r>
+            <a:br>
+              <a:rPr lang="en-US" sz="2400" b="0" spc="-100" dirty="0">
+                <a:solidFill>
+                  <a:srgbClr val="203232"/>
+                </a:solidFill>
+                <a:latin typeface="+mn-lt"/>
+                <a:ea typeface="+mn-ea"/>
+                <a:cs typeface="Arial"/>
+              </a:rPr>
+            </a:br>
+            <a:br>
+              <a:rPr lang="en-US" sz="2400" b="0" spc="-100" dirty="0">
+                <a:solidFill>
+                  <a:srgbClr val="203232"/>
+                </a:solidFill>
+                <a:latin typeface="+mn-lt"/>
+                <a:ea typeface="+mn-ea"/>
+                <a:cs typeface="Arial"/>
+              </a:rPr>
+            </a:br>
+            <a:r>
+              <a:rPr lang="en-US" sz="2400" b="0" spc="-100" dirty="0">
+                <a:solidFill>
+                  <a:srgbClr val="203232"/>
+                </a:solidFill>
+                <a:latin typeface="+mn-lt"/>
+                <a:ea typeface="+mn-ea"/>
+                <a:cs typeface="Arial"/>
+              </a:rPr>
+              <a:t>Our Dataset Has 756 Rows</a:t>
+            </a:r>
+            <a:br>
+              <a:rPr lang="en-GB" sz="2400" b="0" spc="-100" dirty="0">
+                <a:solidFill>
+                  <a:srgbClr val="203232"/>
+                </a:solidFill>
+                <a:latin typeface="+mn-lt"/>
+                <a:ea typeface="+mn-ea"/>
+                <a:cs typeface="Arial"/>
+              </a:rPr>
+            </a:br>
+            <a:endParaRPr lang="en-GB" sz="2400" b="0" spc="-100" dirty="0">
               <a:solidFill>
-                <a:srgbClr val="FF0000"/>
+                <a:srgbClr val="203232"/>
               </a:solidFill>
-              <a:cs typeface="Arial"/>
-            </a:endParaRPr>
-          </a:p>
-          <a:p>
-            <a:pPr marL="742950" indent="-742950">
-              <a:lnSpc>
-                <a:spcPts val="2880"/>
-              </a:lnSpc>
-              <a:spcBef>
-                <a:spcPts val="0"/>
-              </a:spcBef>
-              <a:spcAft>
-                <a:spcPts val="992"/>
-              </a:spcAft>
-              <a:buAutoNum type="arabicPeriod"/>
-            </a:pPr>
-            <a:r>
-              <a:rPr lang="en-GB" sz="3600" dirty="0">
-                <a:solidFill>
-                  <a:srgbClr val="FF0000"/>
-                </a:solidFill>
-                <a:cs typeface="Arial"/>
-              </a:rPr>
-              <a:t>The columns/variable names you include in your research question  (two columns).</a:t>
-            </a:r>
-            <a:endParaRPr lang="en-US" sz="3600" b="0" dirty="0">
-              <a:solidFill>
-                <a:srgbClr val="FF0000"/>
-              </a:solidFill>
-              <a:cs typeface="Arial"/>
-            </a:endParaRPr>
-          </a:p>
-          <a:p>
-            <a:pPr marL="742950" indent="-742950">
-              <a:lnSpc>
-                <a:spcPts val="2880"/>
-              </a:lnSpc>
-              <a:spcBef>
-                <a:spcPts val="0"/>
-              </a:spcBef>
-              <a:spcAft>
-                <a:spcPts val="992"/>
-              </a:spcAft>
-              <a:buAutoNum type="arabicPeriod"/>
-            </a:pPr>
-            <a:r>
-              <a:rPr lang="en-GB" sz="3600" dirty="0">
-                <a:solidFill>
-                  <a:srgbClr val="FF0000"/>
-                </a:solidFill>
-                <a:cs typeface="Arial"/>
-              </a:rPr>
-              <a:t>At least 5 rows of the data</a:t>
-            </a:r>
-            <a:endParaRPr lang="en-US" sz="3600" b="0" dirty="0">
-              <a:solidFill>
-                <a:srgbClr val="FF0000"/>
-              </a:solidFill>
-              <a:cs typeface="Arial"/>
-            </a:endParaRPr>
-          </a:p>
-          <a:p>
-            <a:pPr marL="742950" indent="-742950">
-              <a:lnSpc>
-                <a:spcPts val="2880"/>
-              </a:lnSpc>
-              <a:spcBef>
-                <a:spcPts val="0"/>
-              </a:spcBef>
-              <a:spcAft>
-                <a:spcPts val="992"/>
-              </a:spcAft>
-              <a:buAutoNum type="arabicPeriod"/>
-            </a:pPr>
-            <a:r>
-              <a:rPr lang="en-GB" sz="3600" dirty="0">
-                <a:solidFill>
-                  <a:srgbClr val="FF0000"/>
-                </a:solidFill>
-                <a:cs typeface="Arial"/>
-              </a:rPr>
-              <a:t>Tell us how many rows your dataset has.</a:t>
-            </a:r>
-            <a:br>
-              <a:rPr lang="en-GB" sz="3600" dirty="0">
-                <a:solidFill>
-                  <a:srgbClr val="FF0000"/>
-                </a:solidFill>
-                <a:cs typeface="Arial"/>
-              </a:rPr>
-            </a:br>
-            <a:endParaRPr lang="en-GB" sz="3600" dirty="0">
-              <a:solidFill>
-                <a:srgbClr val="FF0000"/>
-              </a:solidFill>
+              <a:latin typeface="+mn-lt"/>
+              <a:ea typeface="+mn-ea"/>
               <a:cs typeface="Arial"/>
             </a:endParaRPr>
           </a:p>
@@ -5489,6 +5449,42 @@
           </a:p>
         </p:txBody>
       </p:sp>
+      <p:pic>
+        <p:nvPicPr>
+          <p:cNvPr id="9" name="Picture 8" descr="A table with numbers and letters&#10;&#10;AI-generated content may be incorrect.">
+            <a:extLst>
+              <a:ext uri="{FF2B5EF4-FFF2-40B4-BE49-F238E27FC236}">
+                <a16:creationId xmlns:a16="http://schemas.microsoft.com/office/drawing/2014/main" id="{07120EDE-C2CF-0B68-A6CC-ABD79B495750}"/>
+              </a:ext>
+            </a:extLst>
+          </p:cNvPr>
+          <p:cNvPicPr>
+            <a:picLocks noChangeAspect="1"/>
+          </p:cNvPicPr>
+          <p:nvPr/>
+        </p:nvPicPr>
+        <p:blipFill>
+          <a:blip r:embed="rId3">
+            <a:extLst>
+              <a:ext uri="{28A0092B-C50C-407E-A947-70E740481C1C}">
+                <a14:useLocalDpi xmlns:a14="http://schemas.microsoft.com/office/drawing/2010/main" val="0"/>
+              </a:ext>
+            </a:extLst>
+          </a:blip>
+          <a:stretch>
+            <a:fillRect/>
+          </a:stretch>
+        </p:blipFill>
+        <p:spPr>
+          <a:xfrm>
+            <a:off x="902197" y="1444987"/>
+            <a:ext cx="10387605" cy="2155854"/>
+          </a:xfrm>
+          <a:prstGeom prst="rect">
+            <a:avLst/>
+          </a:prstGeom>
+        </p:spPr>
+      </p:pic>
     </p:spTree>
     <p:extLst>
       <p:ext uri="{BB962C8B-B14F-4D97-AF65-F5344CB8AC3E}">
@@ -6093,7 +6089,7 @@
               <a:t>Interval/Ordinal vs Interval/Ordinal: </a:t>
             </a:r>
             <a:r>
-              <a:rPr lang="en-IE" sz="2400" spc="-100" dirty="0">
+              <a:rPr lang="en-IE" sz="2800" spc="-100" dirty="0">
                 <a:solidFill>
                   <a:srgbClr val="FF0000"/>
                 </a:solidFill>
@@ -6104,7 +6100,7 @@
               <a:t>“</a:t>
             </a:r>
             <a:r>
-              <a:rPr lang="en-US" sz="2400" spc="-100" dirty="0">
+              <a:rPr lang="en-US" sz="2800" spc="-100" dirty="0">
                 <a:solidFill>
                   <a:srgbClr val="FF0000"/>
                 </a:solidFill>
@@ -7649,12 +7645,11 @@
 </file>
 
 <file path=customXml/item1.xml><?xml version="1.0" encoding="utf-8"?>
-<?mso-contentType ?>
-<FormTemplates xmlns="http://schemas.microsoft.com/sharepoint/v3/contenttype/forms">
-  <Display>DocumentLibraryForm</Display>
-  <Edit>DocumentLibraryForm</Edit>
-  <New>DocumentLibraryForm</New>
-</FormTemplates>
+<p:properties xmlns:p="http://schemas.microsoft.com/office/2006/metadata/properties" xmlns:xsi="http://www.w3.org/2001/XMLSchema-instance" xmlns:pc="http://schemas.microsoft.com/office/infopath/2007/PartnerControls">
+  <documentManagement>
+    <Information xmlns="4ad138b4-2b68-4b70-945d-07f8f18b1c9a" xsi:nil="true"/>
+  </documentManagement>
+</p:properties>
 </file>
 
 <file path=customXml/item2.xml><?xml version="1.0" encoding="utf-8"?>
@@ -7883,17 +7878,27 @@
 </file>
 
 <file path=customXml/item3.xml><?xml version="1.0" encoding="utf-8"?>
-<p:properties xmlns:p="http://schemas.microsoft.com/office/2006/metadata/properties" xmlns:xsi="http://www.w3.org/2001/XMLSchema-instance" xmlns:pc="http://schemas.microsoft.com/office/infopath/2007/PartnerControls">
-  <documentManagement>
-    <Information xmlns="4ad138b4-2b68-4b70-945d-07f8f18b1c9a" xsi:nil="true"/>
-  </documentManagement>
-</p:properties>
+<?mso-contentType ?>
+<FormTemplates xmlns="http://schemas.microsoft.com/sharepoint/v3/contenttype/forms">
+  <Display>DocumentLibraryForm</Display>
+  <Edit>DocumentLibraryForm</Edit>
+  <New>DocumentLibraryForm</New>
+</FormTemplates>
 </file>
 
 <file path=customXml/itemProps1.xml><?xml version="1.0" encoding="utf-8"?>
-<ds:datastoreItem xmlns:ds="http://schemas.openxmlformats.org/officeDocument/2006/customXml" ds:itemID="{91C521DD-2673-4EE6-BB9B-DC5C3320FFBB}">
+<ds:datastoreItem xmlns:ds="http://schemas.openxmlformats.org/officeDocument/2006/customXml" ds:itemID="{EDD1FC41-23C7-41B0-B5F9-BF4CD38AD2ED}">
   <ds:schemaRefs>
-    <ds:schemaRef ds:uri="http://schemas.microsoft.com/sharepoint/v3/contenttype/forms"/>
+    <ds:schemaRef ds:uri="3c474641-ec36-472f-b125-6b1b0910eaa4"/>
+    <ds:schemaRef ds:uri="4ad138b4-2b68-4b70-945d-07f8f18b1c9a"/>
+    <ds:schemaRef ds:uri="http://purl.org/dc/dcmitype/"/>
+    <ds:schemaRef ds:uri="http://purl.org/dc/elements/1.1/"/>
+    <ds:schemaRef ds:uri="http://purl.org/dc/terms/"/>
+    <ds:schemaRef ds:uri="http://schemas.microsoft.com/office/2006/documentManagement/types"/>
+    <ds:schemaRef ds:uri="http://schemas.microsoft.com/office/2006/metadata/properties"/>
+    <ds:schemaRef ds:uri="http://schemas.microsoft.com/office/infopath/2007/PartnerControls"/>
+    <ds:schemaRef ds:uri="http://schemas.openxmlformats.org/package/2006/metadata/core-properties"/>
+    <ds:schemaRef ds:uri="http://www.w3.org/XML/1998/namespace"/>
   </ds:schemaRefs>
 </ds:datastoreItem>
 </file>
@@ -7918,18 +7923,9 @@
 </file>
 
 <file path=customXml/itemProps3.xml><?xml version="1.0" encoding="utf-8"?>
-<ds:datastoreItem xmlns:ds="http://schemas.openxmlformats.org/officeDocument/2006/customXml" ds:itemID="{EDD1FC41-23C7-41B0-B5F9-BF4CD38AD2ED}">
+<ds:datastoreItem xmlns:ds="http://schemas.openxmlformats.org/officeDocument/2006/customXml" ds:itemID="{91C521DD-2673-4EE6-BB9B-DC5C3320FFBB}">
   <ds:schemaRefs>
-    <ds:schemaRef ds:uri="3c474641-ec36-472f-b125-6b1b0910eaa4"/>
-    <ds:schemaRef ds:uri="4ad138b4-2b68-4b70-945d-07f8f18b1c9a"/>
-    <ds:schemaRef ds:uri="http://purl.org/dc/dcmitype/"/>
-    <ds:schemaRef ds:uri="http://purl.org/dc/elements/1.1/"/>
-    <ds:schemaRef ds:uri="http://purl.org/dc/terms/"/>
-    <ds:schemaRef ds:uri="http://schemas.microsoft.com/office/2006/documentManagement/types"/>
-    <ds:schemaRef ds:uri="http://schemas.microsoft.com/office/2006/metadata/properties"/>
-    <ds:schemaRef ds:uri="http://schemas.microsoft.com/office/infopath/2007/PartnerControls"/>
-    <ds:schemaRef ds:uri="http://schemas.openxmlformats.org/package/2006/metadata/core-properties"/>
-    <ds:schemaRef ds:uri="http://www.w3.org/XML/1998/namespace"/>
+    <ds:schemaRef ds:uri="http://schemas.microsoft.com/sharepoint/v3/contenttype/forms"/>
   </ds:schemaRefs>
 </ds:datastoreItem>
 </file>
</xml_diff>

<commit_message>
Updated RQ as per instructions in class
</commit_message>
<xml_diff>
--- a/reseach_question_presentation_template.pptx
+++ b/reseach_question_presentation_template.pptx
@@ -256,7 +256,7 @@
             <a:fld id="{93FAAC3A-BD1F-4A00-9099-74B95789FE00}" type="datetimeFigureOut">
               <a:rPr lang="en-GB" smtClean="0"/>
               <a:pPr/>
-              <a:t>02/12/2025</a:t>
+              <a:t>03/12/2025</a:t>
             </a:fld>
             <a:endParaRPr lang="en-GB"/>
           </a:p>
@@ -435,7 +435,7 @@
             <a:fld id="{8E359C8A-39F6-4045-9163-4042C4C26B15}" type="datetimeFigureOut">
               <a:rPr lang="en-GB" smtClean="0"/>
               <a:pPr/>
-              <a:t>02/12/2025</a:t>
+              <a:t>03/12/2025</a:t>
             </a:fld>
             <a:endParaRPr lang="en-GB"/>
           </a:p>
@@ -5147,8 +5147,8 @@
           <a:lstStyle/>
           <a:p>
             <a:r>
-              <a:rPr lang="en-US" sz="2000"/>
-              <a:t>Group Name:                                                            Name of Student Presenting:</a:t>
+              <a:rPr lang="en-US" sz="2000" dirty="0"/>
+              <a:t>Group Name: A 80                                                            Name of Student Presenting: Atik Patwary</a:t>
             </a:r>
           </a:p>
         </p:txBody>
@@ -5180,8 +5180,8 @@
           <a:lstStyle/>
           <a:p>
             <a:r>
-              <a:rPr lang="en-GB"/>
-              <a:t>7COM1079-2025  Student Group No:                    Names of Student Attendees  (all group should attend to get feedback): </a:t>
+              <a:rPr lang="en-GB" dirty="0"/>
+              <a:t>7COM1079-2025  Student Group No:  A-80                  Names of Student Attendees  (all group should attend to get feedback): Atik Patwary, Md Ahmed, Abir Mahmud, Mahmood Parvez, Sayed Harun</a:t>
             </a:r>
           </a:p>
         </p:txBody>
@@ -5347,8 +5347,8 @@
         </p:nvSpPr>
         <p:spPr>
           <a:xfrm>
-            <a:off x="902197" y="3429000"/>
-            <a:ext cx="10913623" cy="2649857"/>
+            <a:off x="812800" y="3361266"/>
+            <a:ext cx="10117928" cy="1921933"/>
           </a:xfrm>
         </p:spPr>
         <p:txBody>
@@ -5369,92 +5369,36 @@
               </a:spcAft>
             </a:pPr>
             <a:br>
-              <a:rPr lang="en-US" sz="2400" b="0" spc="-100" dirty="0">
-                <a:solidFill>
-                  <a:srgbClr val="203232"/>
-                </a:solidFill>
-                <a:latin typeface="+mn-lt"/>
-                <a:ea typeface="+mn-ea"/>
+              <a:rPr lang="en-GB" sz="3600" dirty="0">
+                <a:solidFill>
+                  <a:srgbClr val="FF0000"/>
+                </a:solidFill>
                 <a:cs typeface="Arial"/>
               </a:rPr>
             </a:br>
-            <a:r>
-              <a:rPr lang="en-US" sz="2400" b="0" spc="-100" dirty="0">
-                <a:solidFill>
-                  <a:srgbClr val="203232"/>
-                </a:solidFill>
-                <a:latin typeface="+mn-lt"/>
-                <a:ea typeface="+mn-ea"/>
-                <a:cs typeface="Arial"/>
-              </a:rPr>
-              <a:t>Two Columns Names are -  Confirmatory and Presumptive Lab Total Tested (Daily)  And Confirmatory and Presumptive Lab Percent Positive (Daily)</a:t>
-            </a:r>
-            <a:br>
-              <a:rPr lang="en-US" sz="2400" b="0" spc="-100" dirty="0">
-                <a:solidFill>
-                  <a:srgbClr val="203232"/>
-                </a:solidFill>
-                <a:latin typeface="+mn-lt"/>
-                <a:ea typeface="+mn-ea"/>
-                <a:cs typeface="Arial"/>
-              </a:rPr>
-            </a:br>
-            <a:br>
-              <a:rPr lang="en-US" sz="2400" b="0" spc="-100" dirty="0">
-                <a:solidFill>
-                  <a:srgbClr val="203232"/>
-                </a:solidFill>
-                <a:latin typeface="+mn-lt"/>
-                <a:ea typeface="+mn-ea"/>
-                <a:cs typeface="Arial"/>
-              </a:rPr>
-            </a:br>
-            <a:r>
-              <a:rPr lang="en-US" sz="2400" b="0" spc="-100" dirty="0">
-                <a:solidFill>
-                  <a:srgbClr val="203232"/>
-                </a:solidFill>
-                <a:latin typeface="+mn-lt"/>
-                <a:ea typeface="+mn-ea"/>
-                <a:cs typeface="Arial"/>
-              </a:rPr>
-              <a:t>Our Dataset Has 756 Rows</a:t>
-            </a:r>
-            <a:br>
-              <a:rPr lang="en-GB" sz="2400" b="0" spc="-100" dirty="0">
-                <a:solidFill>
-                  <a:srgbClr val="203232"/>
-                </a:solidFill>
-                <a:latin typeface="+mn-lt"/>
-                <a:ea typeface="+mn-ea"/>
-                <a:cs typeface="Arial"/>
-              </a:rPr>
-            </a:br>
-            <a:endParaRPr lang="en-GB" sz="2400" b="0" spc="-100" dirty="0">
-              <a:solidFill>
-                <a:srgbClr val="203232"/>
-              </a:solidFill>
-              <a:latin typeface="+mn-lt"/>
-              <a:ea typeface="+mn-ea"/>
-              <a:cs typeface="Arial"/>
-            </a:endParaRPr>
-          </a:p>
-          <a:p>
-            <a:endParaRPr lang="en-US" dirty="0">
+            <a:endParaRPr lang="en-GB" sz="3600" dirty="0">
               <a:solidFill>
                 <a:srgbClr val="FF0000"/>
               </a:solidFill>
               <a:cs typeface="Arial"/>
             </a:endParaRPr>
           </a:p>
+          <a:p>
+            <a:endParaRPr lang="en-US" sz="1200" dirty="0">
+              <a:solidFill>
+                <a:srgbClr val="FF0000"/>
+              </a:solidFill>
+              <a:cs typeface="Arial"/>
+            </a:endParaRPr>
+          </a:p>
         </p:txBody>
       </p:sp>
       <p:pic>
         <p:nvPicPr>
-          <p:cNvPr id="9" name="Picture 8" descr="A table with numbers and letters&#10;&#10;AI-generated content may be incorrect.">
-            <a:extLst>
-              <a:ext uri="{FF2B5EF4-FFF2-40B4-BE49-F238E27FC236}">
-                <a16:creationId xmlns:a16="http://schemas.microsoft.com/office/drawing/2014/main" id="{07120EDE-C2CF-0B68-A6CC-ABD79B495750}"/>
+          <p:cNvPr id="5" name="Picture 4" descr="A table with numbers and letters">
+            <a:extLst>
+              <a:ext uri="{FF2B5EF4-FFF2-40B4-BE49-F238E27FC236}">
+                <a16:creationId xmlns:a16="http://schemas.microsoft.com/office/drawing/2014/main" id="{ABE37EC5-FD95-040B-A6FE-1774A6E9BC4F}"/>
               </a:ext>
             </a:extLst>
           </p:cNvPr>
@@ -5477,14 +5421,276 @@
         </p:blipFill>
         <p:spPr>
           <a:xfrm>
-            <a:off x="902197" y="1444987"/>
-            <a:ext cx="10387605" cy="2155854"/>
+            <a:off x="737713" y="1504254"/>
+            <a:ext cx="10489403" cy="2028191"/>
           </a:xfrm>
           <a:prstGeom prst="rect">
             <a:avLst/>
           </a:prstGeom>
         </p:spPr>
       </p:pic>
+      <p:sp>
+        <p:nvSpPr>
+          <p:cNvPr id="6" name="Subtitle 1">
+            <a:extLst>
+              <a:ext uri="{FF2B5EF4-FFF2-40B4-BE49-F238E27FC236}">
+                <a16:creationId xmlns:a16="http://schemas.microsoft.com/office/drawing/2014/main" id="{4D2B114F-8E0D-2333-A8F4-02AF5C8722F0}"/>
+              </a:ext>
+            </a:extLst>
+          </p:cNvPr>
+          <p:cNvSpPr txBox="1">
+            <a:spLocks/>
+          </p:cNvSpPr>
+          <p:nvPr/>
+        </p:nvSpPr>
+        <p:spPr>
+          <a:xfrm>
+            <a:off x="862775" y="3591711"/>
+            <a:ext cx="10287825" cy="1632222"/>
+          </a:xfrm>
+          <a:prstGeom prst="rect">
+            <a:avLst/>
+          </a:prstGeom>
+        </p:spPr>
+        <p:txBody>
+          <a:bodyPr vert="horz" lIns="0" tIns="0" rIns="0" bIns="0" rtlCol="0" anchor="t">
+            <a:noAutofit/>
+          </a:bodyPr>
+          <a:lstStyle>
+            <a:lvl1pPr marL="0" indent="0" algn="l" defTabSz="914400" rtl="0" eaLnBrk="1" latinLnBrk="0" hangingPunct="1">
+              <a:lnSpc>
+                <a:spcPts val="2880"/>
+              </a:lnSpc>
+              <a:spcBef>
+                <a:spcPts val="0"/>
+              </a:spcBef>
+              <a:spcAft>
+                <a:spcPts val="992"/>
+              </a:spcAft>
+              <a:buFont typeface="Arial" panose="020B0604020202020204" pitchFamily="34" charset="0"/>
+              <a:buNone/>
+              <a:defRPr sz="3600" b="1" kern="3000" spc="-100" baseline="0">
+                <a:solidFill>
+                  <a:schemeClr val="tx2"/>
+                </a:solidFill>
+                <a:latin typeface="+mn-lt"/>
+                <a:ea typeface="+mn-ea"/>
+                <a:cs typeface="+mn-cs"/>
+              </a:defRPr>
+            </a:lvl1pPr>
+            <a:lvl2pPr marL="457200" indent="0" algn="ctr" defTabSz="914400" rtl="0" eaLnBrk="1" latinLnBrk="0" hangingPunct="1">
+              <a:lnSpc>
+                <a:spcPts val="2880"/>
+              </a:lnSpc>
+              <a:spcBef>
+                <a:spcPts val="0"/>
+              </a:spcBef>
+              <a:spcAft>
+                <a:spcPts val="992"/>
+              </a:spcAft>
+              <a:buFont typeface="Arial" panose="020B0604020202020204" pitchFamily="34" charset="0"/>
+              <a:buNone/>
+              <a:defRPr sz="2000" kern="2000" spc="-100" baseline="0">
+                <a:solidFill>
+                  <a:srgbClr val="203232"/>
+                </a:solidFill>
+                <a:latin typeface="+mn-lt"/>
+                <a:ea typeface="+mn-ea"/>
+                <a:cs typeface="+mn-cs"/>
+              </a:defRPr>
+            </a:lvl2pPr>
+            <a:lvl3pPr marL="914400" indent="0" algn="ctr" defTabSz="914400" rtl="0" eaLnBrk="1" latinLnBrk="0" hangingPunct="1">
+              <a:lnSpc>
+                <a:spcPts val="2880"/>
+              </a:lnSpc>
+              <a:spcBef>
+                <a:spcPts val="0"/>
+              </a:spcBef>
+              <a:spcAft>
+                <a:spcPts val="992"/>
+              </a:spcAft>
+              <a:buFont typeface="Arial" panose="020B0604020202020204" pitchFamily="34" charset="0"/>
+              <a:buNone/>
+              <a:defRPr sz="1800" kern="2000" spc="-100" baseline="0">
+                <a:solidFill>
+                  <a:srgbClr val="203232"/>
+                </a:solidFill>
+                <a:latin typeface="+mn-lt"/>
+                <a:ea typeface="+mn-ea"/>
+                <a:cs typeface="+mn-cs"/>
+              </a:defRPr>
+            </a:lvl3pPr>
+            <a:lvl4pPr marL="1371600" indent="0" algn="ctr" defTabSz="914400" rtl="0" eaLnBrk="1" latinLnBrk="0" hangingPunct="1">
+              <a:lnSpc>
+                <a:spcPts val="2160"/>
+              </a:lnSpc>
+              <a:spcBef>
+                <a:spcPts val="0"/>
+              </a:spcBef>
+              <a:buFont typeface="Arial" panose="020B0604020202020204" pitchFamily="34" charset="0"/>
+              <a:buNone/>
+              <a:defRPr sz="1600" kern="1200">
+                <a:solidFill>
+                  <a:srgbClr val="203232"/>
+                </a:solidFill>
+                <a:latin typeface="+mn-lt"/>
+                <a:ea typeface="+mn-ea"/>
+                <a:cs typeface="+mn-cs"/>
+              </a:defRPr>
+            </a:lvl4pPr>
+            <a:lvl5pPr marL="1828800" indent="0" algn="ctr" defTabSz="914400" rtl="0" eaLnBrk="1" latinLnBrk="0" hangingPunct="1">
+              <a:lnSpc>
+                <a:spcPts val="2160"/>
+              </a:lnSpc>
+              <a:spcBef>
+                <a:spcPts val="0"/>
+              </a:spcBef>
+              <a:buFont typeface="Arial" panose="020B0604020202020204" pitchFamily="34" charset="0"/>
+              <a:buNone/>
+              <a:defRPr sz="1600" b="1" kern="1200">
+                <a:solidFill>
+                  <a:srgbClr val="203232"/>
+                </a:solidFill>
+                <a:latin typeface="+mn-lt"/>
+                <a:ea typeface="+mn-ea"/>
+                <a:cs typeface="+mn-cs"/>
+              </a:defRPr>
+            </a:lvl5pPr>
+            <a:lvl6pPr marL="2286000" indent="0" algn="ctr" defTabSz="914400" rtl="0" eaLnBrk="1" latinLnBrk="0" hangingPunct="1">
+              <a:lnSpc>
+                <a:spcPct val="90000"/>
+              </a:lnSpc>
+              <a:spcBef>
+                <a:spcPts val="500"/>
+              </a:spcBef>
+              <a:buFont typeface="Arial" panose="020B0604020202020204" pitchFamily="34" charset="0"/>
+              <a:buNone/>
+              <a:defRPr sz="1600" kern="1200">
+                <a:solidFill>
+                  <a:schemeClr val="tx1"/>
+                </a:solidFill>
+                <a:latin typeface="+mn-lt"/>
+                <a:ea typeface="+mn-ea"/>
+                <a:cs typeface="+mn-cs"/>
+              </a:defRPr>
+            </a:lvl6pPr>
+            <a:lvl7pPr marL="2743200" indent="0" algn="ctr" defTabSz="914400" rtl="0" eaLnBrk="1" latinLnBrk="0" hangingPunct="1">
+              <a:lnSpc>
+                <a:spcPct val="90000"/>
+              </a:lnSpc>
+              <a:spcBef>
+                <a:spcPts val="500"/>
+              </a:spcBef>
+              <a:buFont typeface="Arial" panose="020B0604020202020204" pitchFamily="34" charset="0"/>
+              <a:buNone/>
+              <a:defRPr sz="1600" kern="1200">
+                <a:solidFill>
+                  <a:schemeClr val="tx1"/>
+                </a:solidFill>
+                <a:latin typeface="+mn-lt"/>
+                <a:ea typeface="+mn-ea"/>
+                <a:cs typeface="+mn-cs"/>
+              </a:defRPr>
+            </a:lvl7pPr>
+            <a:lvl8pPr marL="3200400" indent="0" algn="ctr" defTabSz="914400" rtl="0" eaLnBrk="1" latinLnBrk="0" hangingPunct="1">
+              <a:lnSpc>
+                <a:spcPct val="90000"/>
+              </a:lnSpc>
+              <a:spcBef>
+                <a:spcPts val="500"/>
+              </a:spcBef>
+              <a:buFont typeface="Arial" panose="020B0604020202020204" pitchFamily="34" charset="0"/>
+              <a:buNone/>
+              <a:defRPr sz="1600" kern="1200">
+                <a:solidFill>
+                  <a:schemeClr val="tx1"/>
+                </a:solidFill>
+                <a:latin typeface="+mn-lt"/>
+                <a:ea typeface="+mn-ea"/>
+                <a:cs typeface="+mn-cs"/>
+              </a:defRPr>
+            </a:lvl8pPr>
+            <a:lvl9pPr marL="3657600" indent="0" algn="ctr" defTabSz="914400" rtl="0" eaLnBrk="1" latinLnBrk="0" hangingPunct="1">
+              <a:lnSpc>
+                <a:spcPct val="90000"/>
+              </a:lnSpc>
+              <a:spcBef>
+                <a:spcPts val="500"/>
+              </a:spcBef>
+              <a:buFont typeface="Arial" panose="020B0604020202020204" pitchFamily="34" charset="0"/>
+              <a:buNone/>
+              <a:defRPr sz="1600" kern="1200">
+                <a:solidFill>
+                  <a:schemeClr val="tx1"/>
+                </a:solidFill>
+                <a:latin typeface="+mn-lt"/>
+                <a:ea typeface="+mn-ea"/>
+                <a:cs typeface="+mn-cs"/>
+              </a:defRPr>
+            </a:lvl9pPr>
+          </a:lstStyle>
+          <a:p>
+            <a:pPr>
+              <a:spcAft>
+                <a:spcPts val="0"/>
+              </a:spcAft>
+            </a:pPr>
+            <a:r>
+              <a:rPr lang="en-US" sz="2400" dirty="0">
+                <a:solidFill>
+                  <a:srgbClr val="203232"/>
+                </a:solidFill>
+                <a:cs typeface="Arial"/>
+              </a:rPr>
+              <a:t>Two Columns Names are -  Date And Confirmatory and Presumptive Lab Percent Positive (Daily)</a:t>
+            </a:r>
+          </a:p>
+          <a:p>
+            <a:pPr>
+              <a:spcAft>
+                <a:spcPts val="0"/>
+              </a:spcAft>
+            </a:pPr>
+            <a:endParaRPr lang="en-US" sz="2400" dirty="0">
+              <a:solidFill>
+                <a:srgbClr val="203232"/>
+              </a:solidFill>
+              <a:cs typeface="Arial"/>
+            </a:endParaRPr>
+          </a:p>
+          <a:p>
+            <a:pPr>
+              <a:spcAft>
+                <a:spcPts val="0"/>
+              </a:spcAft>
+            </a:pPr>
+            <a:r>
+              <a:rPr lang="en-US" sz="2400" dirty="0">
+                <a:solidFill>
+                  <a:srgbClr val="203232"/>
+                </a:solidFill>
+                <a:cs typeface="Arial"/>
+              </a:rPr>
+              <a:t>Our Dataset Has 756 Rows</a:t>
+            </a:r>
+            <a:r>
+              <a:rPr lang="en-GB" sz="2400" dirty="0">
+                <a:solidFill>
+                  <a:srgbClr val="203232"/>
+                </a:solidFill>
+                <a:cs typeface="Arial"/>
+              </a:rPr>
+              <a:t> </a:t>
+            </a:r>
+            <a:endParaRPr lang="en-GB" sz="2400" dirty="0">
+              <a:solidFill>
+                <a:srgbClr val="FF0000"/>
+              </a:solidFill>
+              <a:cs typeface="Arial"/>
+            </a:endParaRPr>
+          </a:p>
+        </p:txBody>
+      </p:sp>
     </p:spTree>
     <p:extLst>
       <p:ext uri="{BB962C8B-B14F-4D97-AF65-F5344CB8AC3E}">
@@ -5660,7 +5866,7 @@
         <p:spPr>
           <a:xfrm>
             <a:off x="965288" y="1698305"/>
-            <a:ext cx="10974945" cy="2699181"/>
+            <a:ext cx="10974945" cy="3286580"/>
           </a:xfrm>
         </p:spPr>
         <p:txBody>
@@ -5689,7 +5895,7 @@
                 <a:latin typeface="Calibri"/>
                 <a:cs typeface="Calibri"/>
               </a:rPr>
-              <a:t>(one sentence):  </a:t>
+              <a:t>(one sentence): </a:t>
             </a:r>
             <a:r>
               <a:rPr lang="en-US" sz="2400" b="0" dirty="0">
@@ -5700,8 +5906,8 @@
             </a:r>
             <a:br>
               <a:rPr lang="en-US" sz="2400" b="0" dirty="0">
-                <a:latin typeface="Calibri"/>
-                <a:cs typeface="Calibri"/>
+                <a:latin typeface="Calibri" panose="020F0502020204030204" pitchFamily="34" charset="0"/>
+                <a:cs typeface="Calibri" panose="020F0502020204030204" pitchFamily="34" charset="0"/>
               </a:rPr>
             </a:br>
             <a:br>
@@ -5711,16 +5917,21 @@
               </a:rPr>
             </a:br>
             <a:r>
-              <a:rPr lang="en-US" sz="2400" b="0" i="1" dirty="0">
-                <a:solidFill>
-                  <a:schemeClr val="accent2">
-                    <a:lumMod val="75000"/>
-                  </a:schemeClr>
-                </a:solidFill>
+              <a:rPr lang="en-US" sz="2400" b="0" dirty="0">
                 <a:latin typeface="Calibri"/>
                 <a:cs typeface="Calibri"/>
               </a:rPr>
-              <a:t>From the column headings in your dataset choose ONE independent * and ONE dependent variable . </a:t>
+              <a:t>Our  Independent variable is: </a:t>
+            </a:r>
+            <a:r>
+              <a:rPr lang="en-US" sz="2400" b="0" dirty="0">
+                <a:solidFill>
+                  <a:srgbClr val="FF0000"/>
+                </a:solidFill>
+                <a:latin typeface="Calibri"/>
+                <a:cs typeface="Calibri"/>
+              </a:rPr>
+              <a:t>Date </a:t>
             </a:r>
             <a:br>
               <a:rPr lang="en-US" sz="2400" b="0" dirty="0">
@@ -5730,32 +5941,6 @@
             </a:br>
             <a:r>
               <a:rPr lang="en-US" sz="2400" b="0" dirty="0">
-                <a:latin typeface="Calibri"/>
-                <a:cs typeface="Calibri"/>
-              </a:rPr>
-              <a:t>Our  Independent variable is: </a:t>
-            </a:r>
-            <a:r>
-              <a:rPr lang="en-US" sz="2400" b="0" dirty="0">
-                <a:solidFill>
-                  <a:srgbClr val="FF0000"/>
-                </a:solidFill>
-                <a:latin typeface="Calibri"/>
-                <a:cs typeface="Calibri"/>
-              </a:rPr>
-              <a:t>Confirmatory and Presumptive Lab Total Tested (Daily)</a:t>
-            </a:r>
-            <a:br>
-              <a:rPr lang="en-US" sz="2400" b="0" dirty="0">
-                <a:solidFill>
-                  <a:srgbClr val="FF0000"/>
-                </a:solidFill>
-                <a:latin typeface="Calibri"/>
-                <a:cs typeface="Calibri"/>
-              </a:rPr>
-            </a:br>
-            <a:r>
-              <a:rPr lang="en-US" sz="2400" b="0" dirty="0">
                 <a:solidFill>
                   <a:srgbClr val="FF0000"/>
                 </a:solidFill>
@@ -5779,7 +5964,7 @@
                 <a:latin typeface="Calibri"/>
                 <a:cs typeface="Calibri"/>
               </a:rPr>
-              <a:t>measurement data.</a:t>
+              <a:t>Nominal/categorial</a:t>
             </a:r>
             <a:br>
               <a:rPr lang="en-US" sz="2400" b="0" dirty="0">
@@ -6037,8 +6222,8 @@
         </p:nvSpPr>
         <p:spPr>
           <a:xfrm>
-            <a:off x="965289" y="1893914"/>
-            <a:ext cx="10640594" cy="2678085"/>
+            <a:off x="965289" y="2057400"/>
+            <a:ext cx="10640594" cy="2514599"/>
           </a:xfrm>
         </p:spPr>
         <p:txBody>
@@ -6052,6 +6237,14 @@
                 <a:spcPct val="100000"/>
               </a:lnSpc>
             </a:pPr>
+            <a:br>
+              <a:rPr lang="en-IE" sz="2400" dirty="0">
+                <a:effectLst/>
+                <a:latin typeface="Calibri" panose="020F0502020204030204" pitchFamily="34" charset="0"/>
+                <a:ea typeface="Calibri" panose="020F0502020204030204" pitchFamily="34" charset="0"/>
+                <a:cs typeface="Times New Roman" panose="02020603050405020304" pitchFamily="18" charset="0"/>
+              </a:rPr>
+            </a:br>
             <a:r>
               <a:rPr lang="en-IE" sz="2400" dirty="0">
                 <a:effectLst/>
@@ -6059,7 +6252,7 @@
                 <a:ea typeface="Calibri" panose="020F0502020204030204" pitchFamily="34" charset="0"/>
                 <a:cs typeface="Times New Roman"/>
               </a:rPr>
-              <a:t>Template </a:t>
+              <a:t>Template</a:t>
             </a:r>
             <a:r>
               <a:rPr lang="en-IE" sz="2400" baseline="30000" dirty="0">
@@ -6068,7 +6261,7 @@
                 <a:ea typeface="Calibri" panose="020F0502020204030204" pitchFamily="34" charset="0"/>
                 <a:cs typeface="Times New Roman"/>
               </a:rPr>
-              <a:t>1</a:t>
+              <a:t>2</a:t>
             </a:r>
             <a:r>
               <a:rPr lang="en-IE" sz="2400" dirty="0">
@@ -6077,7 +6270,7 @@
                 <a:ea typeface="Calibri" panose="020F0502020204030204" pitchFamily="34" charset="0"/>
                 <a:cs typeface="Times New Roman"/>
               </a:rPr>
-              <a:t>: </a:t>
+              <a:t> :</a:t>
             </a:r>
             <a:r>
               <a:rPr lang="en-IE" sz="2400" b="0" dirty="0">
@@ -6086,10 +6279,10 @@
                 <a:ea typeface="Calibri" panose="020F0502020204030204" pitchFamily="34" charset="0"/>
                 <a:cs typeface="Times New Roman"/>
               </a:rPr>
-              <a:t>Interval/Ordinal vs Interval/Ordinal: </a:t>
-            </a:r>
-            <a:r>
-              <a:rPr lang="en-IE" sz="2800" spc="-100" dirty="0">
+              <a:t>Interval/Ordinal vs Nominal. data </a:t>
+            </a:r>
+            <a:r>
+              <a:rPr lang="en-IE" sz="2400" spc="-100" dirty="0">
                 <a:solidFill>
                   <a:srgbClr val="FF0000"/>
                 </a:solidFill>
@@ -6100,7 +6293,7 @@
               <a:t>“</a:t>
             </a:r>
             <a:r>
-              <a:rPr lang="en-US" sz="2800" spc="-100" dirty="0">
+              <a:rPr lang="en-US" sz="2400" spc="-100" dirty="0">
                 <a:solidFill>
                   <a:srgbClr val="FF0000"/>
                 </a:solidFill>
@@ -6108,10 +6301,21 @@
                 <a:ea typeface="+mn-ea"/>
                 <a:cs typeface="+mn-cs"/>
               </a:rPr>
-              <a:t>Is there a correlation between the number of tests conducted daily and the daily positivity rate? ”</a:t>
+              <a:t>Is there a difference in the mean incidence of positive COVID-19 outcomes in Ohio during the period from 2020 to 2022?</a:t>
+            </a:r>
+            <a:r>
+              <a:rPr lang="en-IE" sz="2400" spc="-100" dirty="0">
+                <a:solidFill>
+                  <a:srgbClr val="FF0000"/>
+                </a:solidFill>
+                <a:latin typeface="+mn-lt"/>
+                <a:ea typeface="+mn-ea"/>
+                <a:cs typeface="+mn-cs"/>
+              </a:rPr>
+              <a:t>”.</a:t>
             </a:r>
             <a:br>
-              <a:rPr lang="en-IE" sz="2400" dirty="0">
+              <a:rPr lang="en-GB" sz="2400" b="0" dirty="0">
                 <a:effectLst/>
                 <a:latin typeface="Calibri" panose="020F0502020204030204" pitchFamily="34" charset="0"/>
                 <a:ea typeface="Calibri" panose="020F0502020204030204" pitchFamily="34" charset="0"/>
@@ -6175,22 +6379,22 @@
           <a:lstStyle/>
           <a:p>
             <a:r>
-              <a:rPr lang="en-GB" baseline="30000" dirty="0"/>
+              <a:rPr lang="en-GB" baseline="30000"/>
               <a:t>1</a:t>
             </a:r>
             <a:r>
-              <a:rPr lang="en-GB" b="1" dirty="0">
+              <a:rPr lang="en-GB" b="1">
                 <a:latin typeface="Calibri"/>
                 <a:cs typeface="Calibri"/>
               </a:rPr>
               <a:t>Correlation</a:t>
             </a:r>
             <a:r>
-              <a:rPr lang="en-GB" dirty="0"/>
+              <a:rPr lang="en-GB"/>
               <a:t> (</a:t>
             </a:r>
             <a:r>
-              <a:rPr lang="en-IE" sz="1800" dirty="0">
+              <a:rPr lang="en-IE" sz="1800">
                 <a:effectLst/>
                 <a:latin typeface="Calibri"/>
                 <a:ea typeface="Calibri" panose="020F0502020204030204" pitchFamily="34" charset="0"/>
@@ -6199,7 +6403,7 @@
               <a:t>Analysis of how </a:t>
             </a:r>
             <a:r>
-              <a:rPr lang="en-IE" sz="1800" dirty="0">
+              <a:rPr lang="en-IE" sz="1800">
                 <a:solidFill>
                   <a:srgbClr val="FF0000"/>
                 </a:solidFill>
@@ -6211,7 +6415,7 @@
               <a:t>ordinal</a:t>
             </a:r>
             <a:r>
-              <a:rPr lang="en-IE" dirty="0">
+              <a:rPr lang="en-IE">
                 <a:solidFill>
                   <a:srgbClr val="FF0000"/>
                 </a:solidFill>
@@ -6222,7 +6426,7 @@
               <a:t>/</a:t>
             </a:r>
             <a:r>
-              <a:rPr lang="en-IE" sz="1800" dirty="0">
+              <a:rPr lang="en-IE" sz="1800">
                 <a:solidFill>
                   <a:srgbClr val="FF0000"/>
                 </a:solidFill>
@@ -6234,7 +6438,7 @@
               <a:t>interval </a:t>
             </a:r>
             <a:r>
-              <a:rPr lang="en-IE" sz="1800" dirty="0">
+              <a:rPr lang="en-IE" sz="1800">
                 <a:solidFill>
                   <a:srgbClr val="00B050"/>
                 </a:solidFill>
@@ -6246,7 +6450,7 @@
               <a:t>dependent var</a:t>
             </a:r>
             <a:r>
-              <a:rPr lang="en-IE" sz="1800" dirty="0">
+              <a:rPr lang="en-IE" sz="1800">
                 <a:effectLst/>
                 <a:latin typeface="Calibri"/>
                 <a:ea typeface="Calibri" panose="020F0502020204030204" pitchFamily="34" charset="0"/>
@@ -6255,7 +6459,7 @@
               <a:t> </a:t>
             </a:r>
             <a:r>
-              <a:rPr lang="en-IE" dirty="0">
+              <a:rPr lang="en-IE">
                 <a:latin typeface="Calibri"/>
                 <a:ea typeface="Calibri" panose="020F0502020204030204" pitchFamily="34" charset="0"/>
                 <a:cs typeface="Times New Roman"/>
@@ -6263,7 +6467,7 @@
               <a:t>correlates </a:t>
             </a:r>
             <a:r>
-              <a:rPr lang="en-IE" sz="1800" dirty="0">
+              <a:rPr lang="en-IE" sz="1800">
                 <a:effectLst/>
                 <a:latin typeface="Calibri"/>
                 <a:ea typeface="Calibri" panose="020F0502020204030204" pitchFamily="34" charset="0"/>
@@ -6272,7 +6476,7 @@
               <a:t>to an </a:t>
             </a:r>
             <a:r>
-              <a:rPr lang="en-IE" sz="1800" dirty="0">
+              <a:rPr lang="en-IE" sz="1800">
                 <a:solidFill>
                   <a:srgbClr val="FF0000"/>
                 </a:solidFill>
@@ -6284,7 +6488,7 @@
               <a:t>ordinal/interval </a:t>
             </a:r>
             <a:r>
-              <a:rPr lang="en-IE" sz="1800" dirty="0">
+              <a:rPr lang="en-IE" sz="1800">
                 <a:solidFill>
                   <a:srgbClr val="00B050"/>
                 </a:solidFill>
@@ -6295,14 +6499,14 @@
               </a:rPr>
               <a:t>independent variable)</a:t>
             </a:r>
-            <a:endParaRPr lang="en-GB" dirty="0">
+            <a:endParaRPr lang="en-GB">
               <a:latin typeface="Calibri"/>
               <a:cs typeface="Times New Roman"/>
             </a:endParaRPr>
           </a:p>
           <a:p>
             <a:r>
-              <a:rPr lang="en-IE" sz="1800" b="1" baseline="30000" dirty="0">
+              <a:rPr lang="en-IE" sz="1800" b="1" baseline="30000">
                 <a:effectLst/>
                 <a:latin typeface="Calibri" panose="020F0502020204030204" pitchFamily="34" charset="0"/>
                 <a:ea typeface="Calibri" panose="020F0502020204030204" pitchFamily="34" charset="0"/>
@@ -6311,7 +6515,7 @@
               <a:t>2</a:t>
             </a:r>
             <a:r>
-              <a:rPr lang="en-IE" sz="1800" b="1" dirty="0">
+              <a:rPr lang="en-IE" sz="1800" b="1">
                 <a:effectLst/>
                 <a:latin typeface="Calibri" panose="020F0502020204030204" pitchFamily="34" charset="0"/>
                 <a:ea typeface="Calibri" panose="020F0502020204030204" pitchFamily="34" charset="0"/>
@@ -6320,7 +6524,7 @@
               <a:t>Comparison of means</a:t>
             </a:r>
             <a:r>
-              <a:rPr lang="en-IE" sz="1800" dirty="0">
+              <a:rPr lang="en-IE" sz="1800">
                 <a:effectLst/>
                 <a:latin typeface="Calibri" panose="020F0502020204030204" pitchFamily="34" charset="0"/>
                 <a:ea typeface="Calibri" panose="020F0502020204030204" pitchFamily="34" charset="0"/>
@@ -6331,7 +6535,7 @@
           </a:p>
           <a:p>
             <a:r>
-              <a:rPr lang="en-IE" sz="1800" b="1" baseline="30000" dirty="0">
+              <a:rPr lang="en-IE" sz="1800" b="1" baseline="30000">
                 <a:effectLst/>
                 <a:latin typeface="Calibri" panose="020F0502020204030204" pitchFamily="34" charset="0"/>
                 <a:ea typeface="Calibri" panose="020F0502020204030204" pitchFamily="34" charset="0"/>
@@ -6340,7 +6544,7 @@
               <a:t>3</a:t>
             </a:r>
             <a:r>
-              <a:rPr lang="en-IE" sz="1800" b="1" dirty="0">
+              <a:rPr lang="en-IE" sz="1800" b="1">
                 <a:effectLst/>
                 <a:latin typeface="Calibri" panose="020F0502020204030204" pitchFamily="34" charset="0"/>
                 <a:ea typeface="Calibri" panose="020F0502020204030204" pitchFamily="34" charset="0"/>
@@ -6349,7 +6553,7 @@
               <a:t>Comparison of proportions:</a:t>
             </a:r>
             <a:r>
-              <a:rPr lang="en-IE" sz="1800" dirty="0">
+              <a:rPr lang="en-IE" sz="1800">
                 <a:effectLst/>
                 <a:latin typeface="Calibri" panose="020F0502020204030204" pitchFamily="34" charset="0"/>
                 <a:ea typeface="Calibri" panose="020F0502020204030204" pitchFamily="34" charset="0"/>
@@ -6357,7 +6561,7 @@
               </a:rPr>
               <a:t> Analysis of the difference in proportions of a characteristic shared by members of two different populations. </a:t>
             </a:r>
-            <a:endParaRPr lang="en-GB" dirty="0"/>
+            <a:endParaRPr lang="en-GB"/>
           </a:p>
         </p:txBody>
       </p:sp>
@@ -6475,93 +6679,18 @@
             </a:r>
           </a:p>
           <a:p>
-            <a:pPr marL="457200" indent="-457200">
-              <a:lnSpc>
-                <a:spcPct val="100000"/>
-              </a:lnSpc>
-              <a:buAutoNum type="arabicPeriod"/>
-            </a:pPr>
-            <a:r>
-              <a:rPr lang="en-GB" sz="2000" b="0" dirty="0">
-                <a:latin typeface="Arial"/>
-                <a:cs typeface="Arial"/>
-              </a:rPr>
-              <a:t>Null hypothesis (H</a:t>
-            </a:r>
-            <a:r>
-              <a:rPr lang="en-GB" sz="2000" b="0" baseline="-25000" dirty="0">
-                <a:latin typeface="Arial"/>
-                <a:cs typeface="Arial"/>
-              </a:rPr>
-              <a:t>0</a:t>
-            </a:r>
-            <a:r>
-              <a:rPr lang="en-GB" sz="2000" b="0" dirty="0">
-                <a:latin typeface="Arial"/>
-                <a:cs typeface="Arial"/>
-              </a:rPr>
-              <a:t>): There is </a:t>
-            </a:r>
-            <a:r>
-              <a:rPr lang="en-GB" sz="2000" dirty="0">
-                <a:latin typeface="Arial"/>
-                <a:cs typeface="Arial"/>
-              </a:rPr>
-              <a:t>no </a:t>
-            </a:r>
-            <a:r>
-              <a:rPr lang="en-GB" sz="2000" b="0" dirty="0">
-                <a:latin typeface="Arial"/>
-                <a:cs typeface="Arial"/>
-              </a:rPr>
-              <a:t>effect on the population – so you write one of the following:  </a:t>
-            </a:r>
-          </a:p>
-          <a:p>
             <a:pPr>
               <a:lnSpc>
                 <a:spcPct val="100000"/>
               </a:lnSpc>
             </a:pPr>
-            <a:r>
-              <a:rPr lang="en-GB" sz="2000" b="0" dirty="0">
-                <a:solidFill>
-                  <a:srgbClr val="FF0000"/>
-                </a:solidFill>
-                <a:latin typeface="Arial"/>
-                <a:cs typeface="Arial"/>
-              </a:rPr>
-              <a:t>Null hypothesis (H</a:t>
-            </a:r>
-            <a:r>
-              <a:rPr lang="en-GB" sz="2000" b="0" baseline="-25000" dirty="0">
-                <a:solidFill>
-                  <a:srgbClr val="FF0000"/>
-                </a:solidFill>
-                <a:latin typeface="Arial"/>
-                <a:cs typeface="Arial"/>
-              </a:rPr>
-              <a:t>0</a:t>
-            </a:r>
-            <a:r>
-              <a:rPr lang="en-GB" sz="2000" b="0" dirty="0">
-                <a:solidFill>
-                  <a:srgbClr val="FF0000"/>
-                </a:solidFill>
-                <a:latin typeface="Arial"/>
-                <a:cs typeface="Arial"/>
-              </a:rPr>
-              <a:t>): </a:t>
-            </a:r>
-            <a:r>
-              <a:rPr lang="en-US" sz="2000" b="0" dirty="0">
-                <a:solidFill>
-                  <a:srgbClr val="FF0000"/>
-                </a:solidFill>
-                <a:cs typeface="Arial"/>
-              </a:rPr>
-              <a:t>There is no correlation between daily testing volume and daily positivity rate.</a:t>
-            </a:r>
+            <a:endParaRPr lang="en-GB" sz="2000" b="0" dirty="0">
+              <a:solidFill>
+                <a:srgbClr val="FF0000"/>
+              </a:solidFill>
+              <a:latin typeface="Arial"/>
+              <a:cs typeface="Arial"/>
+            </a:endParaRPr>
           </a:p>
           <a:p>
             <a:pPr>
@@ -6571,39 +6700,47 @@
             </a:pPr>
             <a:r>
               <a:rPr lang="en-GB" sz="2000" b="0" dirty="0">
+                <a:solidFill>
+                  <a:srgbClr val="FF0000"/>
+                </a:solidFill>
                 <a:latin typeface="Arial"/>
                 <a:cs typeface="Arial"/>
               </a:rPr>
-              <a:t>2. Alternative hypothesis (H</a:t>
+              <a:t>Null hypothesis (H</a:t>
             </a:r>
             <a:r>
               <a:rPr lang="en-GB" sz="2000" b="0" baseline="-25000" dirty="0">
+                <a:solidFill>
+                  <a:srgbClr val="FF0000"/>
+                </a:solidFill>
                 <a:latin typeface="Arial"/>
                 <a:cs typeface="Arial"/>
               </a:rPr>
-              <a:t>1</a:t>
+              <a:t>0</a:t>
             </a:r>
             <a:r>
               <a:rPr lang="en-GB" sz="2000" b="0" dirty="0">
+                <a:solidFill>
+                  <a:srgbClr val="FF0000"/>
+                </a:solidFill>
                 <a:latin typeface="Arial"/>
                 <a:cs typeface="Arial"/>
               </a:rPr>
-              <a:t>):  There appears to be an effect on the population – so you copy what you wrote for the Null hypothesis but remove the ‘no’ and replace with ‘</a:t>
-            </a:r>
-            <a:r>
-              <a:rPr lang="en-GB" sz="2000" dirty="0">
-                <a:latin typeface="Arial"/>
+              <a:t>): </a:t>
+            </a:r>
+            <a:r>
+              <a:rPr lang="en-US" sz="2000" b="0" dirty="0">
+                <a:solidFill>
+                  <a:srgbClr val="FF0000"/>
+                </a:solidFill>
                 <a:cs typeface="Arial"/>
               </a:rPr>
-              <a:t>a’  </a:t>
-            </a:r>
-            <a:r>
-              <a:rPr lang="en-GB" sz="2000" b="0" dirty="0">
-                <a:latin typeface="Arial"/>
-                <a:cs typeface="Arial"/>
-              </a:rPr>
-              <a:t>For example:</a:t>
-            </a:r>
+              <a:t>There is no difference in the mean positivity rate among the years from 2020 to 2022 in Ohio.</a:t>
+            </a:r>
+            <a:endParaRPr lang="en-GB" sz="2000" b="0" dirty="0">
+              <a:latin typeface="Arial"/>
+              <a:cs typeface="Arial"/>
+            </a:endParaRPr>
           </a:p>
           <a:p>
             <a:pPr>
@@ -6611,6 +6748,20 @@
                 <a:spcPct val="100000"/>
               </a:lnSpc>
             </a:pPr>
+            <a:endParaRPr lang="en-GB" sz="2000" b="0" dirty="0">
+              <a:solidFill>
+                <a:srgbClr val="FF0000"/>
+              </a:solidFill>
+              <a:latin typeface="Arial"/>
+              <a:cs typeface="Arial"/>
+            </a:endParaRPr>
+          </a:p>
+          <a:p>
+            <a:pPr>
+              <a:lnSpc>
+                <a:spcPct val="100000"/>
+              </a:lnSpc>
+            </a:pPr>
             <a:r>
               <a:rPr lang="en-GB" sz="2000" b="0" dirty="0">
                 <a:solidFill>
@@ -6648,7 +6799,7 @@
                 </a:solidFill>
                 <a:cs typeface="Arial"/>
               </a:rPr>
-              <a:t>There is a correlation between daily testing volume and daily positivity rate.</a:t>
+              <a:t>There is a difference in the mean positivity rate among the years from 2020 to 2022 in Ohio.</a:t>
             </a:r>
             <a:endParaRPr lang="en-GB" sz="2000" b="0" dirty="0">
               <a:solidFill>
@@ -7653,6 +7804,15 @@
 </file>
 
 <file path=customXml/item2.xml><?xml version="1.0" encoding="utf-8"?>
+<?mso-contentType ?>
+<FormTemplates xmlns="http://schemas.microsoft.com/sharepoint/v3/contenttype/forms">
+  <Display>DocumentLibraryForm</Display>
+  <Edit>DocumentLibraryForm</Edit>
+  <New>DocumentLibraryForm</New>
+</FormTemplates>
+</file>
+
+<file path=customXml/item3.xml><?xml version="1.0" encoding="utf-8"?>
 <ct:contentTypeSchema xmlns:ct="http://schemas.microsoft.com/office/2006/metadata/contentType" xmlns:ma="http://schemas.microsoft.com/office/2006/metadata/properties/metaAttributes" ct:_="" ma:_="" ma:contentTypeName="Document" ma:contentTypeID="0x01010026DBA85F447B164191BB36C258697B67" ma:contentTypeVersion="14" ma:contentTypeDescription="Create a new document." ma:contentTypeScope="" ma:versionID="ea511d05ca7f895fe9556935b5c9af34">
   <xsd:schema xmlns:xsd="http://www.w3.org/2001/XMLSchema" xmlns:xs="http://www.w3.org/2001/XMLSchema" xmlns:p="http://schemas.microsoft.com/office/2006/metadata/properties" xmlns:ns2="4ad138b4-2b68-4b70-945d-07f8f18b1c9a" xmlns:ns3="3c474641-ec36-472f-b125-6b1b0910eaa4" targetNamespace="http://schemas.microsoft.com/office/2006/metadata/properties" ma:root="true" ma:fieldsID="662270106d7a7e100bcac2c5f8d29899" ns2:_="" ns3:_="">
     <xsd:import namespace="4ad138b4-2b68-4b70-945d-07f8f18b1c9a"/>
@@ -7877,15 +8037,6 @@
 </ct:contentTypeSchema>
 </file>
 
-<file path=customXml/item3.xml><?xml version="1.0" encoding="utf-8"?>
-<?mso-contentType ?>
-<FormTemplates xmlns="http://schemas.microsoft.com/sharepoint/v3/contenttype/forms">
-  <Display>DocumentLibraryForm</Display>
-  <Edit>DocumentLibraryForm</Edit>
-  <New>DocumentLibraryForm</New>
-</FormTemplates>
-</file>
-
 <file path=customXml/itemProps1.xml><?xml version="1.0" encoding="utf-8"?>
 <ds:datastoreItem xmlns:ds="http://schemas.openxmlformats.org/officeDocument/2006/customXml" ds:itemID="{EDD1FC41-23C7-41B0-B5F9-BF4CD38AD2ED}">
   <ds:schemaRefs>
@@ -7904,6 +8055,14 @@
 </file>
 
 <file path=customXml/itemProps2.xml><?xml version="1.0" encoding="utf-8"?>
+<ds:datastoreItem xmlns:ds="http://schemas.openxmlformats.org/officeDocument/2006/customXml" ds:itemID="{91C521DD-2673-4EE6-BB9B-DC5C3320FFBB}">
+  <ds:schemaRefs>
+    <ds:schemaRef ds:uri="http://schemas.microsoft.com/sharepoint/v3/contenttype/forms"/>
+  </ds:schemaRefs>
+</ds:datastoreItem>
+</file>
+
+<file path=customXml/itemProps3.xml><?xml version="1.0" encoding="utf-8"?>
 <ds:datastoreItem xmlns:ds="http://schemas.openxmlformats.org/officeDocument/2006/customXml" ds:itemID="{421B8C57-903D-4D0E-8336-7B512F760CD1}">
   <ds:schemaRefs>
     <ds:schemaRef ds:uri="3c474641-ec36-472f-b125-6b1b0910eaa4"/>
@@ -7920,12 +8079,4 @@
     <ds:schemaRef ds:uri="http://www.w3.org/2001/XMLSchema"/>
   </ds:schemaRefs>
 </ds:datastoreItem>
-</file>
-
-<file path=customXml/itemProps3.xml><?xml version="1.0" encoding="utf-8"?>
-<ds:datastoreItem xmlns:ds="http://schemas.openxmlformats.org/officeDocument/2006/customXml" ds:itemID="{91C521DD-2673-4EE6-BB9B-DC5C3320FFBB}">
-  <ds:schemaRefs>
-    <ds:schemaRef ds:uri="http://schemas.microsoft.com/sharepoint/v3/contenttype/forms"/>
-  </ds:schemaRefs>
-</ds:datastoreItem>
 </file>
</xml_diff>